<commit_message>
powerpoint fini je crois
</commit_message>
<xml_diff>
--- a/presentation/Presentation Machine de Turing.pptx
+++ b/presentation/Presentation Machine de Turing.pptx
@@ -5,7 +5,7 @@
     <p:sldMasterId id="2147483648" r:id="rId1"/>
   </p:sldMasterIdLst>
   <p:notesMasterIdLst>
-    <p:notesMasterId r:id="rId28"/>
+    <p:notesMasterId r:id="rId29"/>
   </p:notesMasterIdLst>
   <p:sldIdLst>
     <p:sldId id="256" r:id="rId2"/>
@@ -31,9 +31,10 @@
     <p:sldId id="273" r:id="rId22"/>
     <p:sldId id="274" r:id="rId23"/>
     <p:sldId id="277" r:id="rId24"/>
-    <p:sldId id="275" r:id="rId25"/>
-    <p:sldId id="278" r:id="rId26"/>
-    <p:sldId id="280" r:id="rId27"/>
+    <p:sldId id="286" r:id="rId25"/>
+    <p:sldId id="275" r:id="rId26"/>
+    <p:sldId id="278" r:id="rId27"/>
+    <p:sldId id="280" r:id="rId28"/>
   </p:sldIdLst>
   <p:sldSz cx="10080625" cy="5670550"/>
   <p:notesSz cx="7772400" cy="10058400"/>
@@ -4843,53 +4844,6 @@
           </a:p>
         </p:txBody>
       </p:sp>
-      <p:pic>
-        <p:nvPicPr>
-          <p:cNvPr id="2" name="Picture 2" descr="Polytech Tours - Polytech Tours, école d'ingénieurs">
-            <a:extLst>
-              <a:ext uri="{FF2B5EF4-FFF2-40B4-BE49-F238E27FC236}">
-                <a16:creationId xmlns:a16="http://schemas.microsoft.com/office/drawing/2014/main" id="{009710E4-4286-CDDE-E7EB-109C9DDAB24F}"/>
-              </a:ext>
-            </a:extLst>
-          </p:cNvPr>
-          <p:cNvPicPr>
-            <a:picLocks noChangeAspect="1" noChangeArrowheads="1"/>
-          </p:cNvPicPr>
-          <p:nvPr/>
-        </p:nvPicPr>
-        <p:blipFill>
-          <a:blip r:embed="rId2" cstate="print">
-            <a:extLst>
-              <a:ext uri="{28A0092B-C50C-407E-A947-70E740481C1C}">
-                <a14:useLocalDpi xmlns:a14="http://schemas.microsoft.com/office/drawing/2010/main" val="0"/>
-              </a:ext>
-            </a:extLst>
-          </a:blip>
-          <a:srcRect/>
-          <a:stretch>
-            <a:fillRect/>
-          </a:stretch>
-        </p:blipFill>
-        <p:spPr bwMode="auto">
-          <a:xfrm>
-            <a:off x="0" y="4852645"/>
-            <a:ext cx="3985897" cy="817905"/>
-          </a:xfrm>
-          <a:prstGeom prst="rect">
-            <a:avLst/>
-          </a:prstGeom>
-          <a:noFill/>
-          <a:extLst>
-            <a:ext uri="{909E8E84-426E-40DD-AFC4-6F175D3DCCD1}">
-              <a14:hiddenFill xmlns:a14="http://schemas.microsoft.com/office/drawing/2010/main">
-                <a:solidFill>
-                  <a:srgbClr val="FFFFFF"/>
-                </a:solidFill>
-              </a14:hiddenFill>
-            </a:ext>
-          </a:extLst>
-        </p:spPr>
-      </p:pic>
       <p:sp>
         <p:nvSpPr>
           <p:cNvPr id="3" name="Espace réservé du numéro de diapositive 2">
@@ -4919,12 +4873,157 @@
           </a:p>
         </p:txBody>
       </p:sp>
+      <p:sp>
+        <p:nvSpPr>
+          <p:cNvPr id="9" name="ZoneTexte 8">
+            <a:extLst>
+              <a:ext uri="{FF2B5EF4-FFF2-40B4-BE49-F238E27FC236}">
+                <a16:creationId xmlns:a16="http://schemas.microsoft.com/office/drawing/2014/main" id="{C13F9275-F220-EAAC-4D21-3C5D15B15403}"/>
+              </a:ext>
+            </a:extLst>
+          </p:cNvPr>
+          <p:cNvSpPr txBox="1"/>
+          <p:nvPr/>
+        </p:nvSpPr>
+        <p:spPr>
+          <a:xfrm>
+            <a:off x="61762" y="724913"/>
+            <a:ext cx="9002485" cy="1477328"/>
+          </a:xfrm>
+          <a:prstGeom prst="rect">
+            <a:avLst/>
+          </a:prstGeom>
+          <a:noFill/>
+        </p:spPr>
+        <p:txBody>
+          <a:bodyPr wrap="square" rtlCol="0">
+            <a:spAutoFit/>
+          </a:bodyPr>
+          <a:lstStyle/>
+          <a:p>
+            <a:r>
+              <a:rPr lang="fr-FR" dirty="0"/>
+              <a:t>Commande initiale chez </a:t>
+            </a:r>
+            <a:r>
+              <a:rPr lang="fr-FR" dirty="0" err="1"/>
+              <a:t>Farnell</a:t>
+            </a:r>
+            <a:r>
+              <a:rPr lang="fr-FR" dirty="0"/>
+              <a:t> :</a:t>
+            </a:r>
+          </a:p>
+          <a:p>
+            <a:endParaRPr lang="fr-FR" dirty="0"/>
+          </a:p>
+          <a:p>
+            <a:pPr marL="285750" indent="-285750">
+              <a:buFontTx/>
+              <a:buChar char="-"/>
+            </a:pPr>
+            <a:r>
+              <a:rPr lang="fr-FR" dirty="0"/>
+              <a:t>Ecran LCD I2C : </a:t>
+            </a:r>
+            <a:r>
+              <a:rPr lang="fr-FR" sz="1800" b="0" i="0" u="none" strike="noStrike" dirty="0">
+                <a:effectLst/>
+                <a:latin typeface="Arial" panose="020B0604020202020204" pitchFamily="34" charset="0"/>
+              </a:rPr>
+              <a:t>MC21605C6W-BNMLWI-V2</a:t>
+            </a:r>
+            <a:r>
+              <a:rPr lang="fr-FR" dirty="0"/>
+              <a:t> </a:t>
+            </a:r>
+          </a:p>
+          <a:p>
+            <a:pPr marL="285750" indent="-285750">
+              <a:buFontTx/>
+              <a:buChar char="-"/>
+            </a:pPr>
+            <a:r>
+              <a:rPr lang="fr-FR" dirty="0"/>
+              <a:t>Afficheurs 7 segments : </a:t>
+            </a:r>
+            <a:r>
+              <a:rPr lang="fr-FR" sz="1800" b="0" i="0" u="none" strike="noStrike" dirty="0">
+                <a:effectLst/>
+                <a:latin typeface="Arial" panose="020B0604020202020204" pitchFamily="34" charset="0"/>
+              </a:rPr>
+              <a:t>HDSP-7513</a:t>
+            </a:r>
+            <a:r>
+              <a:rPr lang="fr-FR" dirty="0"/>
+              <a:t> </a:t>
+            </a:r>
+          </a:p>
+          <a:p>
+            <a:pPr marL="285750" indent="-285750">
+              <a:buFontTx/>
+              <a:buChar char="-"/>
+            </a:pPr>
+            <a:r>
+              <a:rPr lang="fr-FR" dirty="0" err="1"/>
+              <a:t>LEDs</a:t>
+            </a:r>
+            <a:r>
+              <a:rPr lang="fr-FR" dirty="0"/>
+              <a:t> RGB : </a:t>
+            </a:r>
+            <a:r>
+              <a:rPr lang="fr-FR" sz="1800" b="0" i="0" u="none" strike="noStrike" dirty="0">
+                <a:effectLst/>
+                <a:latin typeface="Arial" panose="020B0604020202020204" pitchFamily="34" charset="0"/>
+              </a:rPr>
+              <a:t>L-59EYC</a:t>
+            </a:r>
+            <a:r>
+              <a:rPr lang="fr-FR" dirty="0"/>
+              <a:t> </a:t>
+            </a:r>
+          </a:p>
+        </p:txBody>
+      </p:sp>
+      <p:sp>
+        <p:nvSpPr>
+          <p:cNvPr id="7" name="ZoneTexte 6">
+            <a:extLst>
+              <a:ext uri="{FF2B5EF4-FFF2-40B4-BE49-F238E27FC236}">
+                <a16:creationId xmlns:a16="http://schemas.microsoft.com/office/drawing/2014/main" id="{6448F17E-CDA4-7E76-EC55-8E01C6F22AF8}"/>
+              </a:ext>
+            </a:extLst>
+          </p:cNvPr>
+          <p:cNvSpPr txBox="1"/>
+          <p:nvPr/>
+        </p:nvSpPr>
+        <p:spPr>
+          <a:xfrm>
+            <a:off x="2520723" y="2652423"/>
+            <a:ext cx="5041446" cy="369332"/>
+          </a:xfrm>
+          <a:prstGeom prst="rect">
+            <a:avLst/>
+          </a:prstGeom>
+          <a:noFill/>
+        </p:spPr>
+        <p:txBody>
+          <a:bodyPr wrap="square">
+            <a:spAutoFit/>
+          </a:bodyPr>
+          <a:lstStyle/>
+          <a:p>
+            <a:endParaRPr lang="fr-FR" dirty="0"/>
+          </a:p>
+        </p:txBody>
+      </p:sp>
       <p:pic>
         <p:nvPicPr>
-          <p:cNvPr id="5" name="Image 4">
-            <a:extLst>
-              <a:ext uri="{FF2B5EF4-FFF2-40B4-BE49-F238E27FC236}">
-                <a16:creationId xmlns:a16="http://schemas.microsoft.com/office/drawing/2014/main" id="{AAAC9C84-7E5D-277A-D65D-2BB3EA87B289}"/>
+          <p:cNvPr id="10" name="Image 9">
+            <a:extLst>
+              <a:ext uri="{FF2B5EF4-FFF2-40B4-BE49-F238E27FC236}">
+                <a16:creationId xmlns:a16="http://schemas.microsoft.com/office/drawing/2014/main" id="{86A462C8-81C3-C0E1-9238-E941754D1097}"/>
               </a:ext>
             </a:extLst>
           </p:cNvPr>
@@ -4934,7 +5033,7 @@
           <p:nvPr/>
         </p:nvPicPr>
         <p:blipFill>
-          <a:blip r:embed="rId3">
+          <a:blip r:embed="rId2" cstate="print">
             <a:extLst>
               <a:ext uri="{28A0092B-C50C-407E-A947-70E740481C1C}">
                 <a14:useLocalDpi xmlns:a14="http://schemas.microsoft.com/office/drawing/2010/main" val="0"/>
@@ -4947,157 +5046,8 @@
         </p:blipFill>
         <p:spPr>
           <a:xfrm>
-            <a:off x="0" y="4847379"/>
-            <a:ext cx="4951220" cy="823171"/>
-          </a:xfrm>
-          <a:prstGeom prst="rect">
-            <a:avLst/>
-          </a:prstGeom>
-        </p:spPr>
-      </p:pic>
-      <p:sp>
-        <p:nvSpPr>
-          <p:cNvPr id="9" name="ZoneTexte 8">
-            <a:extLst>
-              <a:ext uri="{FF2B5EF4-FFF2-40B4-BE49-F238E27FC236}">
-                <a16:creationId xmlns:a16="http://schemas.microsoft.com/office/drawing/2014/main" id="{C13F9275-F220-EAAC-4D21-3C5D15B15403}"/>
-              </a:ext>
-            </a:extLst>
-          </p:cNvPr>
-          <p:cNvSpPr txBox="1"/>
-          <p:nvPr/>
-        </p:nvSpPr>
-        <p:spPr>
-          <a:xfrm>
-            <a:off x="61762" y="724913"/>
-            <a:ext cx="9002485" cy="1477328"/>
-          </a:xfrm>
-          <a:prstGeom prst="rect">
-            <a:avLst/>
-          </a:prstGeom>
-          <a:noFill/>
-        </p:spPr>
-        <p:txBody>
-          <a:bodyPr wrap="square" rtlCol="0">
-            <a:spAutoFit/>
-          </a:bodyPr>
-          <a:lstStyle/>
-          <a:p>
-            <a:r>
-              <a:rPr lang="fr-FR" dirty="0"/>
-              <a:t>Commande initiale chez </a:t>
-            </a:r>
-            <a:r>
-              <a:rPr lang="fr-FR" dirty="0" err="1"/>
-              <a:t>Farnell</a:t>
-            </a:r>
-            <a:r>
-              <a:rPr lang="fr-FR" dirty="0"/>
-              <a:t> :</a:t>
-            </a:r>
-          </a:p>
-          <a:p>
-            <a:endParaRPr lang="fr-FR" dirty="0"/>
-          </a:p>
-          <a:p>
-            <a:pPr marL="285750" indent="-285750">
-              <a:buFontTx/>
-              <a:buChar char="-"/>
-            </a:pPr>
-            <a:r>
-              <a:rPr lang="fr-FR" dirty="0"/>
-              <a:t>Ecran LCD I2C : </a:t>
-            </a:r>
-            <a:r>
-              <a:rPr lang="fr-FR" sz="1800" b="0" i="0" u="none" strike="noStrike" dirty="0">
-                <a:effectLst/>
-                <a:latin typeface="Arial" panose="020B0604020202020204" pitchFamily="34" charset="0"/>
-              </a:rPr>
-              <a:t>MC21605C6W-BNMLWI-V2</a:t>
-            </a:r>
-            <a:r>
-              <a:rPr lang="fr-FR" dirty="0"/>
-              <a:t> </a:t>
-            </a:r>
-          </a:p>
-          <a:p>
-            <a:pPr marL="285750" indent="-285750">
-              <a:buFontTx/>
-              <a:buChar char="-"/>
-            </a:pPr>
-            <a:r>
-              <a:rPr lang="fr-FR" dirty="0"/>
-              <a:t>Afficheurs 7 segments : </a:t>
-            </a:r>
-            <a:r>
-              <a:rPr lang="fr-FR" sz="1800" b="0" i="0" u="none" strike="noStrike" dirty="0">
-                <a:effectLst/>
-                <a:latin typeface="Arial" panose="020B0604020202020204" pitchFamily="34" charset="0"/>
-              </a:rPr>
-              <a:t>HDSP-7513</a:t>
-            </a:r>
-            <a:r>
-              <a:rPr lang="fr-FR" dirty="0"/>
-              <a:t> </a:t>
-            </a:r>
-          </a:p>
-          <a:p>
-            <a:pPr marL="285750" indent="-285750">
-              <a:buFontTx/>
-              <a:buChar char="-"/>
-            </a:pPr>
-            <a:r>
-              <a:rPr lang="fr-FR" dirty="0" err="1"/>
-              <a:t>LEDs</a:t>
-            </a:r>
-            <a:r>
-              <a:rPr lang="fr-FR" dirty="0"/>
-              <a:t> RGB : </a:t>
-            </a:r>
-            <a:r>
-              <a:rPr lang="fr-FR" sz="1800" b="0" i="0" u="none" strike="noStrike" dirty="0">
-                <a:effectLst/>
-                <a:latin typeface="Arial" panose="020B0604020202020204" pitchFamily="34" charset="0"/>
-              </a:rPr>
-              <a:t>L-59EYC</a:t>
-            </a:r>
-            <a:r>
-              <a:rPr lang="fr-FR" dirty="0"/>
-              <a:t> </a:t>
-            </a:r>
-          </a:p>
-        </p:txBody>
-      </p:sp>
-      <p:pic>
-        <p:nvPicPr>
-          <p:cNvPr id="15" name="Image 14" descr="Une image contenant texte, capture d’écran, nombre, ligne&#10;&#10;Description générée automatiquement">
-            <a:extLst>
-              <a:ext uri="{FF2B5EF4-FFF2-40B4-BE49-F238E27FC236}">
-                <a16:creationId xmlns:a16="http://schemas.microsoft.com/office/drawing/2014/main" id="{BEB3920B-A464-1156-0397-EB74594DEA0F}"/>
-              </a:ext>
-            </a:extLst>
-          </p:cNvPr>
-          <p:cNvPicPr>
-            <a:picLocks noChangeAspect="1"/>
-          </p:cNvPicPr>
-          <p:nvPr/>
-        </p:nvPicPr>
-        <p:blipFill>
-          <a:blip r:embed="rId4">
-            <a:extLst>
-              <a:ext uri="{28A0092B-C50C-407E-A947-70E740481C1C}">
-                <a14:useLocalDpi xmlns:a14="http://schemas.microsoft.com/office/drawing/2010/main" val="0"/>
-              </a:ext>
-            </a:extLst>
-          </a:blip>
-          <a:stretch>
-            <a:fillRect/>
-          </a:stretch>
-        </p:blipFill>
-        <p:spPr>
-          <a:xfrm>
-            <a:off x="2889738" y="1913547"/>
-            <a:ext cx="7129125" cy="2891827"/>
+            <a:off x="1371602" y="2281544"/>
+            <a:ext cx="7557970" cy="3186926"/>
           </a:xfrm>
           <a:prstGeom prst="rect">
             <a:avLst/>
@@ -7936,7 +7886,7 @@
           </p:cNvPicPr>
           <p:nvPr/>
         </p:nvPicPr>
-        <p:blipFill>
+        <p:blipFill rotWithShape="1">
           <a:blip r:embed="rId2" cstate="print">
             <a:extLst>
               <a:ext uri="{28A0092B-C50C-407E-A947-70E740481C1C}">
@@ -7944,14 +7894,13 @@
               </a:ext>
             </a:extLst>
           </a:blip>
-          <a:stretch>
-            <a:fillRect/>
-          </a:stretch>
+          <a:srcRect b="5865"/>
+          <a:stretch/>
         </p:blipFill>
         <p:spPr>
           <a:xfrm>
-            <a:off x="2096093" y="0"/>
-            <a:ext cx="6106593" cy="5880632"/>
+            <a:off x="365576" y="575786"/>
+            <a:ext cx="9496882" cy="8609035"/>
           </a:xfrm>
           <a:prstGeom prst="rect">
             <a:avLst/>
@@ -7968,6 +7917,14 @@
   <p:clrMapOvr>
     <a:masterClrMapping/>
   </p:clrMapOvr>
+  <mc:AlternateContent xmlns:mc="http://schemas.openxmlformats.org/markup-compatibility/2006">
+    <mc:Choice xmlns:p14="http://schemas.microsoft.com/office/powerpoint/2010/main" Requires="p14">
+      <p:transition p14:dur="10"/>
+    </mc:Choice>
+    <mc:Fallback>
+      <p:transition/>
+    </mc:Fallback>
+  </mc:AlternateContent>
 </p:sld>
 </file>
 
@@ -7990,95 +7947,10 @@
       </p:grpSpPr>
       <p:sp>
         <p:nvSpPr>
-          <p:cNvPr id="2" name="Titre 1">
-            <a:extLst>
-              <a:ext uri="{FF2B5EF4-FFF2-40B4-BE49-F238E27FC236}">
-                <a16:creationId xmlns:a16="http://schemas.microsoft.com/office/drawing/2014/main" id="{87C1232E-E033-F90A-D288-028D816234A5}"/>
-              </a:ext>
-            </a:extLst>
-          </p:cNvPr>
-          <p:cNvSpPr>
-            <a:spLocks noGrp="1"/>
-          </p:cNvSpPr>
-          <p:nvPr>
-            <p:ph type="title"/>
-          </p:nvPr>
-        </p:nvSpPr>
-        <p:spPr/>
-        <p:txBody>
-          <a:bodyPr/>
-          <a:lstStyle/>
-          <a:p>
-            <a:r>
-              <a:rPr lang="fr-FR" dirty="0"/>
-              <a:t>Implémentation</a:t>
-            </a:r>
-          </a:p>
-        </p:txBody>
-      </p:sp>
-      <p:sp>
-        <p:nvSpPr>
-          <p:cNvPr id="3" name="Sous-titre 2">
-            <a:extLst>
-              <a:ext uri="{FF2B5EF4-FFF2-40B4-BE49-F238E27FC236}">
-                <a16:creationId xmlns:a16="http://schemas.microsoft.com/office/drawing/2014/main" id="{2BA9A0C3-7E0A-A3D8-B577-A45C27ACAA36}"/>
-              </a:ext>
-            </a:extLst>
-          </p:cNvPr>
-          <p:cNvSpPr>
-            <a:spLocks noGrp="1"/>
-          </p:cNvSpPr>
-          <p:nvPr>
-            <p:ph type="subTitle"/>
-          </p:nvPr>
-        </p:nvSpPr>
-        <p:spPr>
-          <a:xfrm>
-            <a:off x="503999" y="1326600"/>
-            <a:ext cx="9362760" cy="3288240"/>
-          </a:xfrm>
-        </p:spPr>
-        <p:txBody>
-          <a:bodyPr/>
-          <a:lstStyle/>
-          <a:p>
-            <a:r>
-              <a:rPr lang="fr-FR" sz="2800" dirty="0"/>
-              <a:t>Librairie MCP23017</a:t>
-            </a:r>
-          </a:p>
-          <a:p>
-            <a:r>
-              <a:rPr lang="fr-FR" sz="2800" dirty="0"/>
-              <a:t>Librairie SK9822</a:t>
-            </a:r>
-          </a:p>
-          <a:p>
-            <a:r>
-              <a:rPr lang="fr-FR" sz="2800" dirty="0"/>
-              <a:t>Librairies I2C, SPI</a:t>
-            </a:r>
-          </a:p>
-          <a:p>
-            <a:r>
-              <a:rPr lang="fr-FR" sz="2800" dirty="0"/>
-              <a:t>Librairie « générale »</a:t>
-            </a:r>
-          </a:p>
-          <a:p>
-            <a:r>
-              <a:rPr lang="fr-FR" sz="2800" dirty="0"/>
-              <a:t>Librairie de calculs (table de transition, conversions, etc.)</a:t>
-            </a:r>
-          </a:p>
-        </p:txBody>
-      </p:sp>
-      <p:sp>
-        <p:nvSpPr>
           <p:cNvPr id="4" name="Espace réservé du numéro de diapositive 3">
             <a:extLst>
               <a:ext uri="{FF2B5EF4-FFF2-40B4-BE49-F238E27FC236}">
-                <a16:creationId xmlns:a16="http://schemas.microsoft.com/office/drawing/2014/main" id="{20A33261-C22A-B2ED-0BB1-8A1AAF26C63B}"/>
+                <a16:creationId xmlns:a16="http://schemas.microsoft.com/office/drawing/2014/main" id="{07F01449-2E6D-27ED-86D0-C4621E7EA262}"/>
               </a:ext>
             </a:extLst>
           </p:cNvPr>
@@ -8104,10 +7976,10 @@
       </p:sp>
       <p:pic>
         <p:nvPicPr>
-          <p:cNvPr id="5" name="Image 4">
-            <a:extLst>
-              <a:ext uri="{FF2B5EF4-FFF2-40B4-BE49-F238E27FC236}">
-                <a16:creationId xmlns:a16="http://schemas.microsoft.com/office/drawing/2014/main" id="{6295FB5A-550A-C5ED-F684-51D314B3443F}"/>
+          <p:cNvPr id="6" name="Image 5" descr="Une image contenant capture d’écran, texte&#10;&#10;Description générée automatiquement">
+            <a:extLst>
+              <a:ext uri="{FF2B5EF4-FFF2-40B4-BE49-F238E27FC236}">
+                <a16:creationId xmlns:a16="http://schemas.microsoft.com/office/drawing/2014/main" id="{1884ECC4-411C-0BBF-F14B-819B89CD3AFD}"/>
               </a:ext>
             </a:extLst>
           </p:cNvPr>
@@ -8116,22 +7988,21 @@
           </p:cNvPicPr>
           <p:nvPr/>
         </p:nvPicPr>
-        <p:blipFill>
-          <a:blip r:embed="rId2">
+        <p:blipFill rotWithShape="1">
+          <a:blip r:embed="rId2" cstate="print">
             <a:extLst>
               <a:ext uri="{28A0092B-C50C-407E-A947-70E740481C1C}">
                 <a14:useLocalDpi xmlns:a14="http://schemas.microsoft.com/office/drawing/2010/main" val="0"/>
               </a:ext>
             </a:extLst>
           </a:blip>
-          <a:stretch>
-            <a:fillRect/>
-          </a:stretch>
+          <a:srcRect l="-84" t="37234" r="84" b="289"/>
+          <a:stretch/>
         </p:blipFill>
         <p:spPr>
           <a:xfrm>
-            <a:off x="0" y="4847379"/>
-            <a:ext cx="4951220" cy="823171"/>
+            <a:off x="357412" y="-269420"/>
+            <a:ext cx="9496882" cy="5713800"/>
           </a:xfrm>
           <a:prstGeom prst="rect">
             <a:avLst/>
@@ -8141,13 +8012,25 @@
     </p:spTree>
     <p:extLst>
       <p:ext uri="{BB962C8B-B14F-4D97-AF65-F5344CB8AC3E}">
-        <p14:creationId xmlns:p14="http://schemas.microsoft.com/office/powerpoint/2010/main" val="2852072325"/>
+        <p14:creationId xmlns:p14="http://schemas.microsoft.com/office/powerpoint/2010/main" val="2111946923"/>
       </p:ext>
     </p:extLst>
   </p:cSld>
   <p:clrMapOvr>
     <a:masterClrMapping/>
   </p:clrMapOvr>
+  <mc:AlternateContent xmlns:mc="http://schemas.openxmlformats.org/markup-compatibility/2006">
+    <mc:Choice xmlns:p159="http://schemas.microsoft.com/office/powerpoint/2015/09/main" Requires="p159">
+      <p:transition xmlns:p14="http://schemas.microsoft.com/office/powerpoint/2010/main" spd="slow" p14:dur="2000">
+        <p159:morph option="byObject"/>
+      </p:transition>
+    </mc:Choice>
+    <mc:Fallback>
+      <p:transition spd="slow">
+        <p:fade/>
+      </p:transition>
+    </mc:Fallback>
+  </mc:AlternateContent>
 </p:sld>
 </file>
 
@@ -8173,7 +8056,7 @@
           <p:cNvPr id="2" name="Titre 1">
             <a:extLst>
               <a:ext uri="{FF2B5EF4-FFF2-40B4-BE49-F238E27FC236}">
-                <a16:creationId xmlns:a16="http://schemas.microsoft.com/office/drawing/2014/main" id="{13D39F2D-082B-714D-C7C7-5F676F48C8CC}"/>
+                <a16:creationId xmlns:a16="http://schemas.microsoft.com/office/drawing/2014/main" id="{87C1232E-E033-F90A-D288-028D816234A5}"/>
               </a:ext>
             </a:extLst>
           </p:cNvPr>
@@ -8184,19 +8067,71 @@
             <p:ph type="title"/>
           </p:nvPr>
         </p:nvSpPr>
-        <p:spPr>
-          <a:xfrm>
-            <a:off x="4370292" y="858540"/>
-            <a:ext cx="1340040" cy="946440"/>
-          </a:xfrm>
-        </p:spPr>
+        <p:spPr/>
         <p:txBody>
           <a:bodyPr/>
           <a:lstStyle/>
           <a:p>
             <a:r>
               <a:rPr lang="fr-FR" dirty="0"/>
-              <a:t>Bilan</a:t>
+              <a:t>Implémentation</a:t>
+            </a:r>
+          </a:p>
+        </p:txBody>
+      </p:sp>
+      <p:sp>
+        <p:nvSpPr>
+          <p:cNvPr id="3" name="Sous-titre 2">
+            <a:extLst>
+              <a:ext uri="{FF2B5EF4-FFF2-40B4-BE49-F238E27FC236}">
+                <a16:creationId xmlns:a16="http://schemas.microsoft.com/office/drawing/2014/main" id="{2BA9A0C3-7E0A-A3D8-B577-A45C27ACAA36}"/>
+              </a:ext>
+            </a:extLst>
+          </p:cNvPr>
+          <p:cNvSpPr>
+            <a:spLocks noGrp="1"/>
+          </p:cNvSpPr>
+          <p:nvPr>
+            <p:ph type="subTitle"/>
+          </p:nvPr>
+        </p:nvSpPr>
+        <p:spPr>
+          <a:xfrm>
+            <a:off x="503999" y="1326600"/>
+            <a:ext cx="9362760" cy="3288240"/>
+          </a:xfrm>
+        </p:spPr>
+        <p:txBody>
+          <a:bodyPr/>
+          <a:lstStyle/>
+          <a:p>
+            <a:r>
+              <a:rPr lang="fr-FR" sz="2800" dirty="0"/>
+              <a:t>Librairie MCP23017</a:t>
+            </a:r>
+          </a:p>
+          <a:p>
+            <a:r>
+              <a:rPr lang="fr-FR" sz="2800" dirty="0"/>
+              <a:t>Librairie SK9822</a:t>
+            </a:r>
+          </a:p>
+          <a:p>
+            <a:r>
+              <a:rPr lang="fr-FR" sz="2800" dirty="0"/>
+              <a:t>Librairies I2C, SPI</a:t>
+            </a:r>
+          </a:p>
+          <a:p>
+            <a:r>
+              <a:rPr lang="fr-FR" sz="2800" dirty="0"/>
+              <a:t>Librairie « générale »</a:t>
+            </a:r>
+          </a:p>
+          <a:p>
+            <a:r>
+              <a:rPr lang="fr-FR" sz="2800" dirty="0"/>
+              <a:t>Librairie de calculs (table de transition, conversions, etc.)</a:t>
             </a:r>
           </a:p>
         </p:txBody>
@@ -8206,7 +8141,7 @@
           <p:cNvPr id="4" name="Espace réservé du numéro de diapositive 3">
             <a:extLst>
               <a:ext uri="{FF2B5EF4-FFF2-40B4-BE49-F238E27FC236}">
-                <a16:creationId xmlns:a16="http://schemas.microsoft.com/office/drawing/2014/main" id="{0C044F6A-DAC0-7D84-29D2-4FE35DA91AFC}"/>
+                <a16:creationId xmlns:a16="http://schemas.microsoft.com/office/drawing/2014/main" id="{20A33261-C22A-B2ED-0BB1-8A1AAF26C63B}"/>
               </a:ext>
             </a:extLst>
           </p:cNvPr>
@@ -8232,10 +8167,10 @@
       </p:sp>
       <p:pic>
         <p:nvPicPr>
-          <p:cNvPr id="7" name="Image 6">
-            <a:extLst>
-              <a:ext uri="{FF2B5EF4-FFF2-40B4-BE49-F238E27FC236}">
-                <a16:creationId xmlns:a16="http://schemas.microsoft.com/office/drawing/2014/main" id="{6A12A0B6-F148-CE1F-633A-B4D83315EE8D}"/>
+          <p:cNvPr id="5" name="Image 4">
+            <a:extLst>
+              <a:ext uri="{FF2B5EF4-FFF2-40B4-BE49-F238E27FC236}">
+                <a16:creationId xmlns:a16="http://schemas.microsoft.com/office/drawing/2014/main" id="{6295FB5A-550A-C5ED-F684-51D314B3443F}"/>
               </a:ext>
             </a:extLst>
           </p:cNvPr>
@@ -8269,7 +8204,7 @@
     </p:spTree>
     <p:extLst>
       <p:ext uri="{BB962C8B-B14F-4D97-AF65-F5344CB8AC3E}">
-        <p14:creationId xmlns:p14="http://schemas.microsoft.com/office/powerpoint/2010/main" val="1791122186"/>
+        <p14:creationId xmlns:p14="http://schemas.microsoft.com/office/powerpoint/2010/main" val="2852072325"/>
       </p:ext>
     </p:extLst>
   </p:cSld>
@@ -8298,6 +8233,134 @@
       </p:grpSpPr>
       <p:sp>
         <p:nvSpPr>
+          <p:cNvPr id="2" name="Titre 1">
+            <a:extLst>
+              <a:ext uri="{FF2B5EF4-FFF2-40B4-BE49-F238E27FC236}">
+                <a16:creationId xmlns:a16="http://schemas.microsoft.com/office/drawing/2014/main" id="{13D39F2D-082B-714D-C7C7-5F676F48C8CC}"/>
+              </a:ext>
+            </a:extLst>
+          </p:cNvPr>
+          <p:cNvSpPr>
+            <a:spLocks noGrp="1"/>
+          </p:cNvSpPr>
+          <p:nvPr>
+            <p:ph type="title"/>
+          </p:nvPr>
+        </p:nvSpPr>
+        <p:spPr>
+          <a:xfrm>
+            <a:off x="4370292" y="858540"/>
+            <a:ext cx="1340040" cy="946440"/>
+          </a:xfrm>
+        </p:spPr>
+        <p:txBody>
+          <a:bodyPr/>
+          <a:lstStyle/>
+          <a:p>
+            <a:r>
+              <a:rPr lang="fr-FR" dirty="0"/>
+              <a:t>Bilan</a:t>
+            </a:r>
+          </a:p>
+        </p:txBody>
+      </p:sp>
+      <p:sp>
+        <p:nvSpPr>
+          <p:cNvPr id="4" name="Espace réservé du numéro de diapositive 3">
+            <a:extLst>
+              <a:ext uri="{FF2B5EF4-FFF2-40B4-BE49-F238E27FC236}">
+                <a16:creationId xmlns:a16="http://schemas.microsoft.com/office/drawing/2014/main" id="{0C044F6A-DAC0-7D84-29D2-4FE35DA91AFC}"/>
+              </a:ext>
+            </a:extLst>
+          </p:cNvPr>
+          <p:cNvSpPr>
+            <a:spLocks noGrp="1"/>
+          </p:cNvSpPr>
+          <p:nvPr>
+            <p:ph type="sldNum" idx="3"/>
+          </p:nvPr>
+        </p:nvSpPr>
+        <p:spPr/>
+        <p:txBody>
+          <a:bodyPr/>
+          <a:lstStyle/>
+          <a:p>
+            <a:fld id="{74A1DB29-52D7-44FB-91A6-D4FF9B58DED1}" type="slidenum">
+              <a:rPr lang="fr-FR" smtClean="0"/>
+              <a:t>26</a:t>
+            </a:fld>
+            <a:endParaRPr lang="fr-FR"/>
+          </a:p>
+        </p:txBody>
+      </p:sp>
+      <p:pic>
+        <p:nvPicPr>
+          <p:cNvPr id="7" name="Image 6">
+            <a:extLst>
+              <a:ext uri="{FF2B5EF4-FFF2-40B4-BE49-F238E27FC236}">
+                <a16:creationId xmlns:a16="http://schemas.microsoft.com/office/drawing/2014/main" id="{6A12A0B6-F148-CE1F-633A-B4D83315EE8D}"/>
+              </a:ext>
+            </a:extLst>
+          </p:cNvPr>
+          <p:cNvPicPr>
+            <a:picLocks noChangeAspect="1"/>
+          </p:cNvPicPr>
+          <p:nvPr/>
+        </p:nvPicPr>
+        <p:blipFill>
+          <a:blip r:embed="rId2">
+            <a:extLst>
+              <a:ext uri="{28A0092B-C50C-407E-A947-70E740481C1C}">
+                <a14:useLocalDpi xmlns:a14="http://schemas.microsoft.com/office/drawing/2010/main" val="0"/>
+              </a:ext>
+            </a:extLst>
+          </a:blip>
+          <a:stretch>
+            <a:fillRect/>
+          </a:stretch>
+        </p:blipFill>
+        <p:spPr>
+          <a:xfrm>
+            <a:off x="0" y="4847379"/>
+            <a:ext cx="4951220" cy="823171"/>
+          </a:xfrm>
+          <a:prstGeom prst="rect">
+            <a:avLst/>
+          </a:prstGeom>
+        </p:spPr>
+      </p:pic>
+    </p:spTree>
+    <p:extLst>
+      <p:ext uri="{BB962C8B-B14F-4D97-AF65-F5344CB8AC3E}">
+        <p14:creationId xmlns:p14="http://schemas.microsoft.com/office/powerpoint/2010/main" val="1791122186"/>
+      </p:ext>
+    </p:extLst>
+  </p:cSld>
+  <p:clrMapOvr>
+    <a:masterClrMapping/>
+  </p:clrMapOvr>
+</p:sld>
+</file>
+
+<file path=ppt/slides/slide27.xml><?xml version="1.0" encoding="utf-8"?>
+<p:sld xmlns:a="http://schemas.openxmlformats.org/drawingml/2006/main" xmlns:r="http://schemas.openxmlformats.org/officeDocument/2006/relationships" xmlns:p="http://schemas.openxmlformats.org/presentationml/2006/main">
+  <p:cSld>
+    <p:spTree>
+      <p:nvGrpSpPr>
+        <p:cNvPr id="1" name=""/>
+        <p:cNvGrpSpPr/>
+        <p:nvPr/>
+      </p:nvGrpSpPr>
+      <p:grpSpPr>
+        <a:xfrm>
+          <a:off x="0" y="0"/>
+          <a:ext cx="0" cy="0"/>
+          <a:chOff x="0" y="0"/>
+          <a:chExt cx="0" cy="0"/>
+        </a:xfrm>
+      </p:grpSpPr>
+      <p:sp>
+        <p:nvSpPr>
           <p:cNvPr id="3" name="Sous-titre 2">
             <a:extLst>
               <a:ext uri="{FF2B5EF4-FFF2-40B4-BE49-F238E27FC236}">
@@ -8355,7 +8418,7 @@
           <a:p>
             <a:fld id="{74A1DB29-52D7-44FB-91A6-D4FF9B58DED1}" type="slidenum">
               <a:rPr lang="fr-FR" smtClean="0"/>
-              <a:t>26</a:t>
+              <a:t>27</a:t>
             </a:fld>
             <a:endParaRPr lang="fr-FR"/>
           </a:p>

</xml_diff>